<commit_message>
login page connected with mongodb
</commit_message>
<xml_diff>
--- a/MINOR PROJECT-1.pptx
+++ b/MINOR PROJECT-1.pptx
@@ -5,10 +5,10 @@
     <p:sldMasterId id="2147483766" r:id="rId1"/>
   </p:sldMasterIdLst>
   <p:notesMasterIdLst>
-    <p:notesMasterId r:id="rId22"/>
+    <p:notesMasterId r:id="rId20"/>
   </p:notesMasterIdLst>
   <p:handoutMasterIdLst>
-    <p:handoutMasterId r:id="rId23"/>
+    <p:handoutMasterId r:id="rId21"/>
   </p:handoutMasterIdLst>
   <p:sldIdLst>
     <p:sldId id="287" r:id="rId2"/>
@@ -26,11 +26,9 @@
     <p:sldId id="286" r:id="rId14"/>
     <p:sldId id="279" r:id="rId15"/>
     <p:sldId id="280" r:id="rId16"/>
-    <p:sldId id="285" r:id="rId17"/>
-    <p:sldId id="283" r:id="rId18"/>
-    <p:sldId id="264" r:id="rId19"/>
-    <p:sldId id="282" r:id="rId20"/>
-    <p:sldId id="284" r:id="rId21"/>
+    <p:sldId id="264" r:id="rId17"/>
+    <p:sldId id="282" r:id="rId18"/>
+    <p:sldId id="284" r:id="rId19"/>
   </p:sldIdLst>
   <p:sldSz cx="12192000" cy="6858000"/>
   <p:notesSz cx="6858000" cy="9144000"/>
@@ -234,7 +232,7 @@
           <a:p>
             <a:fld id="{C1866161-D383-45DC-9645-1D21647A8641}" type="datetimeFigureOut">
               <a:rPr lang="en-US" smtClean="0"/>
-              <a:t>9/28/2022</a:t>
+              <a:t>11/22/2022</a:t>
             </a:fld>
             <a:endParaRPr lang="en-US" dirty="0"/>
           </a:p>
@@ -411,7 +409,7 @@
           <a:p>
             <a:fld id="{733789D0-CA34-4934-A369-C3113E12A3EF}" type="datetimeFigureOut">
               <a:rPr lang="en-US" smtClean="0"/>
-              <a:t>9/28/2022</a:t>
+              <a:t>11/22/2022</a:t>
             </a:fld>
             <a:endParaRPr lang="en-US" dirty="0"/>
           </a:p>
@@ -1144,7 +1142,7 @@
           <a:p>
             <a:fld id="{D5D79418-37EB-4378-AD22-89DBB000B0DA}" type="slidenum">
               <a:rPr lang="en-US" smtClean="0"/>
-              <a:t>18</a:t>
+              <a:t>16</a:t>
             </a:fld>
             <a:endParaRPr lang="en-US" dirty="0"/>
           </a:p>
@@ -1389,7 +1387,7 @@
           <a:p>
             <a:fld id="{616D6166-2B42-4F11-BAA6-8ABAE1BE810C}" type="datetimeFigureOut">
               <a:rPr lang="en-US" noProof="0" smtClean="0"/>
-              <a:t>9/28/2022</a:t>
+              <a:t>11/22/2022</a:t>
             </a:fld>
             <a:endParaRPr lang="en-US" noProof="0" dirty="0"/>
           </a:p>
@@ -1884,7 +1882,7 @@
           <a:p>
             <a:fld id="{616D6166-2B42-4F11-BAA6-8ABAE1BE810C}" type="datetimeFigureOut">
               <a:rPr lang="en-US" noProof="0" smtClean="0"/>
-              <a:t>9/28/2022</a:t>
+              <a:t>11/22/2022</a:t>
             </a:fld>
             <a:endParaRPr lang="en-US" noProof="0" dirty="0"/>
           </a:p>
@@ -2144,7 +2142,7 @@
           <a:p>
             <a:fld id="{616D6166-2B42-4F11-BAA6-8ABAE1BE810C}" type="datetimeFigureOut">
               <a:rPr lang="en-US" noProof="0" smtClean="0"/>
-              <a:t>9/28/2022</a:t>
+              <a:t>11/22/2022</a:t>
             </a:fld>
             <a:endParaRPr lang="en-US" noProof="0" dirty="0"/>
           </a:p>
@@ -2663,7 +2661,7 @@
           <a:p>
             <a:fld id="{616D6166-2B42-4F11-BAA6-8ABAE1BE810C}" type="datetimeFigureOut">
               <a:rPr lang="en-US" noProof="0" smtClean="0"/>
-              <a:t>9/28/2022</a:t>
+              <a:t>11/22/2022</a:t>
             </a:fld>
             <a:endParaRPr lang="en-US" noProof="0" dirty="0"/>
           </a:p>
@@ -3363,7 +3361,7 @@
           <a:p>
             <a:fld id="{616D6166-2B42-4F11-BAA6-8ABAE1BE810C}" type="datetimeFigureOut">
               <a:rPr lang="en-US" noProof="0" smtClean="0"/>
-              <a:t>9/28/2022</a:t>
+              <a:t>11/22/2022</a:t>
             </a:fld>
             <a:endParaRPr lang="en-US" noProof="0" dirty="0"/>
           </a:p>
@@ -3914,7 +3912,7 @@
           <a:p>
             <a:fld id="{616D6166-2B42-4F11-BAA6-8ABAE1BE810C}" type="datetimeFigureOut">
               <a:rPr lang="en-US" noProof="0" smtClean="0"/>
-              <a:t>9/28/2022</a:t>
+              <a:t>11/22/2022</a:t>
             </a:fld>
             <a:endParaRPr lang="en-US" noProof="0" dirty="0"/>
           </a:p>
@@ -4453,7 +4451,7 @@
           <a:p>
             <a:fld id="{616D6166-2B42-4F11-BAA6-8ABAE1BE810C}" type="datetimeFigureOut">
               <a:rPr lang="en-US" noProof="0" smtClean="0"/>
-              <a:t>9/28/2022</a:t>
+              <a:t>11/22/2022</a:t>
             </a:fld>
             <a:endParaRPr lang="en-US" noProof="0" dirty="0"/>
           </a:p>
@@ -4804,7 +4802,7 @@
           <a:p>
             <a:fld id="{616D6166-2B42-4F11-BAA6-8ABAE1BE810C}" type="datetimeFigureOut">
               <a:rPr lang="en-US" noProof="0" smtClean="0"/>
-              <a:t>9/28/2022</a:t>
+              <a:t>11/22/2022</a:t>
             </a:fld>
             <a:endParaRPr lang="en-US" noProof="0" dirty="0"/>
           </a:p>
@@ -5312,7 +5310,7 @@
           <a:p>
             <a:fld id="{616D6166-2B42-4F11-BAA6-8ABAE1BE810C}" type="datetimeFigureOut">
               <a:rPr lang="en-US" noProof="0" smtClean="0"/>
-              <a:t>9/28/2022</a:t>
+              <a:t>11/22/2022</a:t>
             </a:fld>
             <a:endParaRPr lang="en-US" noProof="0" dirty="0"/>
           </a:p>
@@ -5974,7 +5972,7 @@
           <a:p>
             <a:fld id="{616D6166-2B42-4F11-BAA6-8ABAE1BE810C}" type="datetimeFigureOut">
               <a:rPr lang="en-US" noProof="0" smtClean="0"/>
-              <a:t>9/28/2022</a:t>
+              <a:t>11/22/2022</a:t>
             </a:fld>
             <a:endParaRPr lang="en-US" noProof="0" dirty="0"/>
           </a:p>
@@ -6541,7 +6539,7 @@
           <a:p>
             <a:fld id="{616D6166-2B42-4F11-BAA6-8ABAE1BE810C}" type="datetimeFigureOut">
               <a:rPr lang="en-US" noProof="0" smtClean="0"/>
-              <a:t>9/28/2022</a:t>
+              <a:t>11/22/2022</a:t>
             </a:fld>
             <a:endParaRPr lang="en-US" noProof="0" dirty="0"/>
           </a:p>
@@ -7040,7 +7038,7 @@
           <a:p>
             <a:fld id="{616D6166-2B42-4F11-BAA6-8ABAE1BE810C}" type="datetimeFigureOut">
               <a:rPr lang="en-US" noProof="0" smtClean="0"/>
-              <a:t>9/28/2022</a:t>
+              <a:t>11/22/2022</a:t>
             </a:fld>
             <a:endParaRPr lang="en-US" noProof="0" dirty="0"/>
           </a:p>
@@ -7604,7 +7602,7 @@
           <a:p>
             <a:fld id="{616D6166-2B42-4F11-BAA6-8ABAE1BE810C}" type="datetimeFigureOut">
               <a:rPr lang="en-US" noProof="0" smtClean="0"/>
-              <a:t>9/28/2022</a:t>
+              <a:t>11/22/2022</a:t>
             </a:fld>
             <a:endParaRPr lang="en-US" noProof="0" dirty="0"/>
           </a:p>
@@ -7946,7 +7944,7 @@
           <a:p>
             <a:fld id="{616D6166-2B42-4F11-BAA6-8ABAE1BE810C}" type="datetimeFigureOut">
               <a:rPr lang="en-US" noProof="0" smtClean="0"/>
-              <a:t>9/28/2022</a:t>
+              <a:t>11/22/2022</a:t>
             </a:fld>
             <a:endParaRPr lang="en-US" noProof="0" dirty="0"/>
           </a:p>
@@ -8341,7 +8339,7 @@
           <a:p>
             <a:fld id="{616D6166-2B42-4F11-BAA6-8ABAE1BE810C}" type="datetimeFigureOut">
               <a:rPr lang="en-US" noProof="0" smtClean="0"/>
-              <a:t>9/28/2022</a:t>
+              <a:t>11/22/2022</a:t>
             </a:fld>
             <a:endParaRPr lang="en-US" noProof="0" dirty="0"/>
           </a:p>
@@ -8880,7 +8878,7 @@
           <a:p>
             <a:fld id="{616D6166-2B42-4F11-BAA6-8ABAE1BE810C}" type="datetimeFigureOut">
               <a:rPr lang="en-US" noProof="0" smtClean="0"/>
-              <a:t>9/28/2022</a:t>
+              <a:t>11/22/2022</a:t>
             </a:fld>
             <a:endParaRPr lang="en-US" noProof="0" dirty="0"/>
           </a:p>
@@ -9447,7 +9445,7 @@
           <a:p>
             <a:fld id="{616D6166-2B42-4F11-BAA6-8ABAE1BE810C}" type="datetimeFigureOut">
               <a:rPr lang="en-US" noProof="0" smtClean="0"/>
-              <a:t>9/28/2022</a:t>
+              <a:t>11/22/2022</a:t>
             </a:fld>
             <a:endParaRPr lang="en-US" noProof="0" dirty="0"/>
           </a:p>
@@ -9919,7 +9917,7 @@
           <a:p>
             <a:fld id="{616D6166-2B42-4F11-BAA6-8ABAE1BE810C}" type="datetimeFigureOut">
               <a:rPr lang="en-US" noProof="0" smtClean="0"/>
-              <a:t>9/28/2022</a:t>
+              <a:t>11/22/2022</a:t>
             </a:fld>
             <a:endParaRPr lang="en-US" noProof="0" dirty="0"/>
           </a:p>
@@ -12116,468 +12114,6 @@
 </file>
 
 <file path=ppt/slides/slide16.xml><?xml version="1.0" encoding="utf-8"?>
-<p:sld xmlns:a="http://schemas.openxmlformats.org/drawingml/2006/main" xmlns:r="http://schemas.openxmlformats.org/officeDocument/2006/relationships" xmlns:p="http://schemas.openxmlformats.org/presentationml/2006/main">
-  <p:cSld>
-    <p:spTree>
-      <p:nvGrpSpPr>
-        <p:cNvPr id="1" name=""/>
-        <p:cNvGrpSpPr/>
-        <p:nvPr/>
-      </p:nvGrpSpPr>
-      <p:grpSpPr>
-        <a:xfrm>
-          <a:off x="0" y="0"/>
-          <a:ext cx="0" cy="0"/>
-          <a:chOff x="0" y="0"/>
-          <a:chExt cx="0" cy="0"/>
-        </a:xfrm>
-      </p:grpSpPr>
-      <p:sp>
-        <p:nvSpPr>
-          <p:cNvPr id="2" name="Rectangle 1">
-            <a:extLst>
-              <a:ext uri="{FF2B5EF4-FFF2-40B4-BE49-F238E27FC236}">
-                <a16:creationId xmlns:a16="http://schemas.microsoft.com/office/drawing/2014/main" id="{FA0A5D39-AD8D-7401-A422-52EC670D0D57}"/>
-              </a:ext>
-            </a:extLst>
-          </p:cNvPr>
-          <p:cNvSpPr/>
-          <p:nvPr/>
-        </p:nvSpPr>
-        <p:spPr>
-          <a:xfrm>
-            <a:off x="3409730" y="525976"/>
-            <a:ext cx="4360489" cy="923330"/>
-          </a:xfrm>
-          <a:prstGeom prst="rect">
-            <a:avLst/>
-          </a:prstGeom>
-          <a:noFill/>
-        </p:spPr>
-        <p:txBody>
-          <a:bodyPr wrap="none" lIns="91440" tIns="45720" rIns="91440" bIns="45720">
-            <a:spAutoFit/>
-          </a:bodyPr>
-          <a:lstStyle/>
-          <a:p>
-            <a:pPr algn="ctr"/>
-            <a:r>
-              <a:rPr lang="en-US" sz="5400" b="1" cap="none" spc="0" dirty="0">
-                <a:ln w="9525">
-                  <a:solidFill>
-                    <a:schemeClr val="bg1"/>
-                  </a:solidFill>
-                  <a:prstDash val="solid"/>
-                </a:ln>
-                <a:solidFill>
-                  <a:schemeClr val="tx1"/>
-                </a:solidFill>
-                <a:effectLst>
-                  <a:outerShdw blurRad="12700" dist="38100" dir="2700000" algn="tl" rotWithShape="0">
-                    <a:schemeClr val="bg1">
-                      <a:lumMod val="50000"/>
-                    </a:schemeClr>
-                  </a:outerShdw>
-                </a:effectLst>
-              </a:rPr>
-              <a:t>ADVANTAGES</a:t>
-            </a:r>
-          </a:p>
-        </p:txBody>
-      </p:sp>
-      <p:sp>
-        <p:nvSpPr>
-          <p:cNvPr id="3" name="TextBox 2">
-            <a:extLst>
-              <a:ext uri="{FF2B5EF4-FFF2-40B4-BE49-F238E27FC236}">
-                <a16:creationId xmlns:a16="http://schemas.microsoft.com/office/drawing/2014/main" id="{12617C09-F217-C611-035A-9B3BD33A7BA8}"/>
-              </a:ext>
-            </a:extLst>
-          </p:cNvPr>
-          <p:cNvSpPr txBox="1"/>
-          <p:nvPr/>
-        </p:nvSpPr>
-        <p:spPr>
-          <a:xfrm>
-            <a:off x="1376039" y="2068497"/>
-            <a:ext cx="5282213" cy="3385542"/>
-          </a:xfrm>
-          <a:prstGeom prst="rect">
-            <a:avLst/>
-          </a:prstGeom>
-          <a:noFill/>
-        </p:spPr>
-        <p:txBody>
-          <a:bodyPr wrap="square" rtlCol="0">
-            <a:spAutoFit/>
-          </a:bodyPr>
-          <a:lstStyle/>
-          <a:p>
-            <a:r>
-              <a:rPr lang="en-IN" sz="2800" dirty="0"/>
-              <a:t>1. Saves Time</a:t>
-            </a:r>
-          </a:p>
-          <a:p>
-            <a:endParaRPr lang="en-US" sz="2800" dirty="0"/>
-          </a:p>
-          <a:p>
-            <a:r>
-              <a:rPr lang="en-US" sz="2800" dirty="0"/>
-              <a:t>2. </a:t>
-            </a:r>
-            <a:r>
-              <a:rPr lang="en-US" sz="2800"/>
-              <a:t>Prevent proxy</a:t>
-            </a:r>
-            <a:endParaRPr lang="en-US" sz="2800" dirty="0"/>
-          </a:p>
-          <a:p>
-            <a:endParaRPr lang="en-US" sz="2800" dirty="0"/>
-          </a:p>
-          <a:p>
-            <a:r>
-              <a:rPr lang="en-US" sz="2800" dirty="0"/>
-              <a:t>3. No paper work</a:t>
-            </a:r>
-          </a:p>
-          <a:p>
-            <a:endParaRPr lang="en-US" sz="2800" dirty="0"/>
-          </a:p>
-          <a:p>
-            <a:r>
-              <a:rPr lang="en-US" sz="2800" dirty="0"/>
-              <a:t>4. More efficient</a:t>
-            </a:r>
-            <a:endParaRPr lang="en-IN" sz="2800" dirty="0"/>
-          </a:p>
-          <a:p>
-            <a:pPr marL="342900" indent="-342900">
-              <a:buAutoNum type="arabicPeriod"/>
-            </a:pPr>
-            <a:endParaRPr lang="en-IN" dirty="0"/>
-          </a:p>
-        </p:txBody>
-      </p:sp>
-    </p:spTree>
-    <p:extLst>
-      <p:ext uri="{BB962C8B-B14F-4D97-AF65-F5344CB8AC3E}">
-        <p14:creationId xmlns:p14="http://schemas.microsoft.com/office/powerpoint/2010/main" val="1944130514"/>
-      </p:ext>
-    </p:extLst>
-  </p:cSld>
-  <p:clrMapOvr>
-    <a:masterClrMapping/>
-  </p:clrMapOvr>
-</p:sld>
-</file>
-
-<file path=ppt/slides/slide17.xml><?xml version="1.0" encoding="utf-8"?>
-<p:sld xmlns:a="http://schemas.openxmlformats.org/drawingml/2006/main" xmlns:r="http://schemas.openxmlformats.org/officeDocument/2006/relationships" xmlns:p="http://schemas.openxmlformats.org/presentationml/2006/main">
-  <p:cSld>
-    <p:spTree>
-      <p:nvGrpSpPr>
-        <p:cNvPr id="1" name=""/>
-        <p:cNvGrpSpPr/>
-        <p:nvPr/>
-      </p:nvGrpSpPr>
-      <p:grpSpPr>
-        <a:xfrm>
-          <a:off x="0" y="0"/>
-          <a:ext cx="0" cy="0"/>
-          <a:chOff x="0" y="0"/>
-          <a:chExt cx="0" cy="0"/>
-        </a:xfrm>
-      </p:grpSpPr>
-      <p:sp>
-        <p:nvSpPr>
-          <p:cNvPr id="2" name="Title 1">
-            <a:extLst>
-              <a:ext uri="{FF2B5EF4-FFF2-40B4-BE49-F238E27FC236}">
-                <a16:creationId xmlns:a16="http://schemas.microsoft.com/office/drawing/2014/main" id="{44A666B2-2F4E-BF12-5A4A-A8087BF352D2}"/>
-              </a:ext>
-            </a:extLst>
-          </p:cNvPr>
-          <p:cNvSpPr>
-            <a:spLocks noGrp="1"/>
-          </p:cNvSpPr>
-          <p:nvPr>
-            <p:ph type="title"/>
-          </p:nvPr>
-        </p:nvSpPr>
-        <p:spPr>
-          <a:xfrm>
-            <a:off x="2926372" y="790201"/>
-            <a:ext cx="6803555" cy="1080938"/>
-          </a:xfrm>
-        </p:spPr>
-        <p:txBody>
-          <a:bodyPr/>
-          <a:lstStyle/>
-          <a:p>
-            <a:r>
-              <a:rPr lang="en-IN" dirty="0">
-                <a:latin typeface="+mn-lt"/>
-              </a:rPr>
-              <a:t>SYSTEM REQUIREMENTS</a:t>
-            </a:r>
-          </a:p>
-        </p:txBody>
-      </p:sp>
-      <p:sp>
-        <p:nvSpPr>
-          <p:cNvPr id="3" name="TextBox 2">
-            <a:extLst>
-              <a:ext uri="{FF2B5EF4-FFF2-40B4-BE49-F238E27FC236}">
-                <a16:creationId xmlns:a16="http://schemas.microsoft.com/office/drawing/2014/main" id="{80E0C977-812C-A6BF-216E-EAF87D15424E}"/>
-              </a:ext>
-            </a:extLst>
-          </p:cNvPr>
-          <p:cNvSpPr txBox="1"/>
-          <p:nvPr/>
-        </p:nvSpPr>
-        <p:spPr>
-          <a:xfrm>
-            <a:off x="1464816" y="2547891"/>
-            <a:ext cx="3657600" cy="369332"/>
-          </a:xfrm>
-          <a:prstGeom prst="rect">
-            <a:avLst/>
-          </a:prstGeom>
-          <a:noFill/>
-        </p:spPr>
-        <p:txBody>
-          <a:bodyPr wrap="square" rtlCol="0">
-            <a:spAutoFit/>
-          </a:bodyPr>
-          <a:lstStyle/>
-          <a:p>
-            <a:r>
-              <a:rPr lang="en-US" dirty="0"/>
-              <a:t>HARDWARE SPECIFICATIONS</a:t>
-            </a:r>
-            <a:endParaRPr lang="en-IN" dirty="0"/>
-          </a:p>
-        </p:txBody>
-      </p:sp>
-      <p:sp>
-        <p:nvSpPr>
-          <p:cNvPr id="4" name="TextBox 3">
-            <a:extLst>
-              <a:ext uri="{FF2B5EF4-FFF2-40B4-BE49-F238E27FC236}">
-                <a16:creationId xmlns:a16="http://schemas.microsoft.com/office/drawing/2014/main" id="{596E2787-D94F-C332-2A18-8963748664E4}"/>
-              </a:ext>
-            </a:extLst>
-          </p:cNvPr>
-          <p:cNvSpPr txBox="1"/>
-          <p:nvPr/>
-        </p:nvSpPr>
-        <p:spPr>
-          <a:xfrm>
-            <a:off x="7430610" y="2547891"/>
-            <a:ext cx="4030462" cy="369332"/>
-          </a:xfrm>
-          <a:prstGeom prst="rect">
-            <a:avLst/>
-          </a:prstGeom>
-          <a:noFill/>
-        </p:spPr>
-        <p:txBody>
-          <a:bodyPr wrap="square" rtlCol="0">
-            <a:spAutoFit/>
-          </a:bodyPr>
-          <a:lstStyle/>
-          <a:p>
-            <a:r>
-              <a:rPr lang="en-US" dirty="0"/>
-              <a:t>SOFTWARE SPECIFICATIONS</a:t>
-            </a:r>
-            <a:endParaRPr lang="en-IN" dirty="0"/>
-          </a:p>
-        </p:txBody>
-      </p:sp>
-      <p:sp>
-        <p:nvSpPr>
-          <p:cNvPr id="6" name="TextBox 5">
-            <a:extLst>
-              <a:ext uri="{FF2B5EF4-FFF2-40B4-BE49-F238E27FC236}">
-                <a16:creationId xmlns:a16="http://schemas.microsoft.com/office/drawing/2014/main" id="{560FB5CB-58BF-4AF4-ADDE-4F8CD9BE0809}"/>
-              </a:ext>
-            </a:extLst>
-          </p:cNvPr>
-          <p:cNvSpPr txBox="1"/>
-          <p:nvPr/>
-        </p:nvSpPr>
-        <p:spPr>
-          <a:xfrm>
-            <a:off x="1464816" y="3189790"/>
-            <a:ext cx="3144253" cy="2308324"/>
-          </a:xfrm>
-          <a:prstGeom prst="rect">
-            <a:avLst/>
-          </a:prstGeom>
-          <a:noFill/>
-        </p:spPr>
-        <p:txBody>
-          <a:bodyPr wrap="square" rtlCol="0">
-            <a:spAutoFit/>
-          </a:bodyPr>
-          <a:lstStyle/>
-          <a:p>
-            <a:r>
-              <a:rPr lang="en-US" dirty="0"/>
-              <a:t>Mobile Phone:</a:t>
-            </a:r>
-          </a:p>
-          <a:p>
-            <a:pPr marL="285750" indent="-285750">
-              <a:buFont typeface="Arial" panose="020B0604020202020204" pitchFamily="34" charset="0"/>
-              <a:buChar char="•"/>
-            </a:pPr>
-            <a:r>
-              <a:rPr lang="en-IN" dirty="0"/>
-              <a:t>2GB or more RAM</a:t>
-            </a:r>
-          </a:p>
-          <a:p>
-            <a:pPr marL="285750" indent="-285750">
-              <a:buFont typeface="Arial" panose="020B0604020202020204" pitchFamily="34" charset="0"/>
-              <a:buChar char="•"/>
-            </a:pPr>
-            <a:r>
-              <a:rPr lang="en-IN" dirty="0"/>
-              <a:t>CPU having 1.5Ghz or more clock speed</a:t>
-            </a:r>
-          </a:p>
-          <a:p>
-            <a:endParaRPr lang="en-IN" dirty="0"/>
-          </a:p>
-          <a:p>
-            <a:r>
-              <a:rPr lang="en-IN" dirty="0"/>
-              <a:t>PC:</a:t>
-            </a:r>
-          </a:p>
-          <a:p>
-            <a:pPr marL="285750" indent="-285750">
-              <a:buFont typeface="Arial" panose="020B0604020202020204" pitchFamily="34" charset="0"/>
-              <a:buChar char="•"/>
-            </a:pPr>
-            <a:r>
-              <a:rPr lang="en-IN" dirty="0"/>
-              <a:t>4GB or more RAM</a:t>
-            </a:r>
-          </a:p>
-          <a:p>
-            <a:pPr marL="285750" indent="-285750">
-              <a:buFont typeface="Arial" panose="020B0604020202020204" pitchFamily="34" charset="0"/>
-              <a:buChar char="•"/>
-            </a:pPr>
-            <a:r>
-              <a:rPr lang="en-IN" dirty="0"/>
-              <a:t>Core i3 or equivalent</a:t>
-            </a:r>
-          </a:p>
-        </p:txBody>
-      </p:sp>
-      <p:sp>
-        <p:nvSpPr>
-          <p:cNvPr id="7" name="TextBox 6">
-            <a:extLst>
-              <a:ext uri="{FF2B5EF4-FFF2-40B4-BE49-F238E27FC236}">
-                <a16:creationId xmlns:a16="http://schemas.microsoft.com/office/drawing/2014/main" id="{193F11AA-66EE-4959-85D1-0B86D47E9762}"/>
-              </a:ext>
-            </a:extLst>
-          </p:cNvPr>
-          <p:cNvSpPr txBox="1"/>
-          <p:nvPr/>
-        </p:nvSpPr>
-        <p:spPr>
-          <a:xfrm>
-            <a:off x="7430610" y="3189790"/>
-            <a:ext cx="2743200" cy="2308324"/>
-          </a:xfrm>
-          <a:prstGeom prst="rect">
-            <a:avLst/>
-          </a:prstGeom>
-          <a:noFill/>
-        </p:spPr>
-        <p:txBody>
-          <a:bodyPr wrap="square" rtlCol="0">
-            <a:spAutoFit/>
-          </a:bodyPr>
-          <a:lstStyle/>
-          <a:p>
-            <a:r>
-              <a:rPr lang="en-US" dirty="0"/>
-              <a:t>Mobile Phone:</a:t>
-            </a:r>
-          </a:p>
-          <a:p>
-            <a:pPr marL="285750" indent="-285750">
-              <a:buFont typeface="Arial" panose="020B0604020202020204" pitchFamily="34" charset="0"/>
-              <a:buChar char="•"/>
-            </a:pPr>
-            <a:r>
-              <a:rPr lang="en-US" dirty="0"/>
-              <a:t>Android 8 or above</a:t>
-            </a:r>
-          </a:p>
-          <a:p>
-            <a:pPr marL="285750" indent="-285750">
-              <a:buFont typeface="Arial" panose="020B0604020202020204" pitchFamily="34" charset="0"/>
-              <a:buChar char="•"/>
-            </a:pPr>
-            <a:r>
-              <a:rPr lang="en-US" dirty="0"/>
-              <a:t>iOS 10 or above</a:t>
-            </a:r>
-          </a:p>
-          <a:p>
-            <a:endParaRPr lang="en-IN" dirty="0"/>
-          </a:p>
-          <a:p>
-            <a:r>
-              <a:rPr lang="en-IN" dirty="0"/>
-              <a:t>PC:</a:t>
-            </a:r>
-          </a:p>
-          <a:p>
-            <a:pPr marL="285750" indent="-285750">
-              <a:buFont typeface="Arial" panose="020B0604020202020204" pitchFamily="34" charset="0"/>
-              <a:buChar char="•"/>
-            </a:pPr>
-            <a:r>
-              <a:rPr lang="en-IN" dirty="0"/>
-              <a:t>Windows XP or above</a:t>
-            </a:r>
-          </a:p>
-          <a:p>
-            <a:pPr marL="285750" indent="-285750">
-              <a:buFont typeface="Arial" panose="020B0604020202020204" pitchFamily="34" charset="0"/>
-              <a:buChar char="•"/>
-            </a:pPr>
-            <a:r>
-              <a:rPr lang="en-US" dirty="0"/>
-              <a:t>macOS High Sierra 10.13 or later</a:t>
-            </a:r>
-          </a:p>
-        </p:txBody>
-      </p:sp>
-    </p:spTree>
-    <p:extLst>
-      <p:ext uri="{BB962C8B-B14F-4D97-AF65-F5344CB8AC3E}">
-        <p14:creationId xmlns:p14="http://schemas.microsoft.com/office/powerpoint/2010/main" val="1802949707"/>
-      </p:ext>
-    </p:extLst>
-  </p:cSld>
-  <p:clrMapOvr>
-    <a:masterClrMapping/>
-  </p:clrMapOvr>
-</p:sld>
-</file>
-
-<file path=ppt/slides/slide18.xml><?xml version="1.0" encoding="utf-8"?>
 <p:sld xmlns:a="http://schemas.openxmlformats.org/drawingml/2006/main" xmlns:r="http://schemas.openxmlformats.org/officeDocument/2006/relationships" xmlns:p="http://schemas.openxmlformats.org/presentationml/2006/main">
   <p:cSld>
     <p:spTree>
@@ -19649,7 +19185,7 @@
 </p:sld>
 </file>
 
-<file path=ppt/slides/slide19.xml><?xml version="1.0" encoding="utf-8"?>
+<file path=ppt/slides/slide17.xml><?xml version="1.0" encoding="utf-8"?>
 <p:sld xmlns:a="http://schemas.openxmlformats.org/drawingml/2006/main" xmlns:r="http://schemas.openxmlformats.org/officeDocument/2006/relationships" xmlns:p="http://schemas.openxmlformats.org/presentationml/2006/main">
   <p:cSld>
     <p:spTree>
@@ -20104,6 +19640,89 @@
     <p:extLst>
       <p:ext uri="{BB962C8B-B14F-4D97-AF65-F5344CB8AC3E}">
         <p14:creationId xmlns:p14="http://schemas.microsoft.com/office/powerpoint/2010/main" val="1650304776"/>
+      </p:ext>
+    </p:extLst>
+  </p:cSld>
+  <p:clrMapOvr>
+    <a:masterClrMapping/>
+  </p:clrMapOvr>
+</p:sld>
+</file>
+
+<file path=ppt/slides/slide18.xml><?xml version="1.0" encoding="utf-8"?>
+<p:sld xmlns:a="http://schemas.openxmlformats.org/drawingml/2006/main" xmlns:r="http://schemas.openxmlformats.org/officeDocument/2006/relationships" xmlns:p="http://schemas.openxmlformats.org/presentationml/2006/main">
+  <p:cSld>
+    <p:spTree>
+      <p:nvGrpSpPr>
+        <p:cNvPr id="1" name=""/>
+        <p:cNvGrpSpPr/>
+        <p:nvPr/>
+      </p:nvGrpSpPr>
+      <p:grpSpPr>
+        <a:xfrm>
+          <a:off x="0" y="0"/>
+          <a:ext cx="0" cy="0"/>
+          <a:chOff x="0" y="0"/>
+          <a:chExt cx="0" cy="0"/>
+        </a:xfrm>
+      </p:grpSpPr>
+      <p:sp>
+        <p:nvSpPr>
+          <p:cNvPr id="2" name="Rectangle 1">
+            <a:extLst>
+              <a:ext uri="{FF2B5EF4-FFF2-40B4-BE49-F238E27FC236}">
+                <a16:creationId xmlns:a16="http://schemas.microsoft.com/office/drawing/2014/main" id="{78C3D850-7A43-187D-D78B-62D9DD98215D}"/>
+              </a:ext>
+            </a:extLst>
+          </p:cNvPr>
+          <p:cNvSpPr/>
+          <p:nvPr/>
+        </p:nvSpPr>
+        <p:spPr>
+          <a:xfrm>
+            <a:off x="2814222" y="2541207"/>
+            <a:ext cx="5727908" cy="1323439"/>
+          </a:xfrm>
+          <a:prstGeom prst="rect">
+            <a:avLst/>
+          </a:prstGeom>
+          <a:noFill/>
+        </p:spPr>
+        <p:txBody>
+          <a:bodyPr wrap="square" lIns="91440" tIns="45720" rIns="91440" bIns="45720">
+            <a:spAutoFit/>
+          </a:bodyPr>
+          <a:lstStyle/>
+          <a:p>
+            <a:pPr algn="ctr"/>
+            <a:r>
+              <a:rPr lang="en-US" sz="8000" b="1" cap="none" spc="0" dirty="0">
+                <a:ln w="9525">
+                  <a:solidFill>
+                    <a:schemeClr val="bg1"/>
+                  </a:solidFill>
+                  <a:prstDash val="solid"/>
+                </a:ln>
+                <a:solidFill>
+                  <a:schemeClr val="tx1"/>
+                </a:solidFill>
+                <a:effectLst>
+                  <a:outerShdw blurRad="12700" dist="38100" dir="2700000" algn="tl" rotWithShape="0">
+                    <a:schemeClr val="bg1">
+                      <a:lumMod val="50000"/>
+                    </a:schemeClr>
+                  </a:outerShdw>
+                </a:effectLst>
+              </a:rPr>
+              <a:t>THANKYOU</a:t>
+            </a:r>
+          </a:p>
+        </p:txBody>
+      </p:sp>
+    </p:spTree>
+    <p:extLst>
+      <p:ext uri="{BB962C8B-B14F-4D97-AF65-F5344CB8AC3E}">
+        <p14:creationId xmlns:p14="http://schemas.microsoft.com/office/powerpoint/2010/main" val="822835669"/>
       </p:ext>
     </p:extLst>
   </p:cSld>
@@ -20285,89 +19904,6 @@
     <p:extLst>
       <p:ext uri="{BB962C8B-B14F-4D97-AF65-F5344CB8AC3E}">
         <p14:creationId xmlns:p14="http://schemas.microsoft.com/office/powerpoint/2010/main" val="2745843633"/>
-      </p:ext>
-    </p:extLst>
-  </p:cSld>
-  <p:clrMapOvr>
-    <a:masterClrMapping/>
-  </p:clrMapOvr>
-</p:sld>
-</file>
-
-<file path=ppt/slides/slide20.xml><?xml version="1.0" encoding="utf-8"?>
-<p:sld xmlns:a="http://schemas.openxmlformats.org/drawingml/2006/main" xmlns:r="http://schemas.openxmlformats.org/officeDocument/2006/relationships" xmlns:p="http://schemas.openxmlformats.org/presentationml/2006/main">
-  <p:cSld>
-    <p:spTree>
-      <p:nvGrpSpPr>
-        <p:cNvPr id="1" name=""/>
-        <p:cNvGrpSpPr/>
-        <p:nvPr/>
-      </p:nvGrpSpPr>
-      <p:grpSpPr>
-        <a:xfrm>
-          <a:off x="0" y="0"/>
-          <a:ext cx="0" cy="0"/>
-          <a:chOff x="0" y="0"/>
-          <a:chExt cx="0" cy="0"/>
-        </a:xfrm>
-      </p:grpSpPr>
-      <p:sp>
-        <p:nvSpPr>
-          <p:cNvPr id="2" name="Rectangle 1">
-            <a:extLst>
-              <a:ext uri="{FF2B5EF4-FFF2-40B4-BE49-F238E27FC236}">
-                <a16:creationId xmlns:a16="http://schemas.microsoft.com/office/drawing/2014/main" id="{78C3D850-7A43-187D-D78B-62D9DD98215D}"/>
-              </a:ext>
-            </a:extLst>
-          </p:cNvPr>
-          <p:cNvSpPr/>
-          <p:nvPr/>
-        </p:nvSpPr>
-        <p:spPr>
-          <a:xfrm>
-            <a:off x="2814222" y="2541207"/>
-            <a:ext cx="5727908" cy="1323439"/>
-          </a:xfrm>
-          <a:prstGeom prst="rect">
-            <a:avLst/>
-          </a:prstGeom>
-          <a:noFill/>
-        </p:spPr>
-        <p:txBody>
-          <a:bodyPr wrap="square" lIns="91440" tIns="45720" rIns="91440" bIns="45720">
-            <a:spAutoFit/>
-          </a:bodyPr>
-          <a:lstStyle/>
-          <a:p>
-            <a:pPr algn="ctr"/>
-            <a:r>
-              <a:rPr lang="en-US" sz="8000" b="1" cap="none" spc="0" dirty="0">
-                <a:ln w="9525">
-                  <a:solidFill>
-                    <a:schemeClr val="bg1"/>
-                  </a:solidFill>
-                  <a:prstDash val="solid"/>
-                </a:ln>
-                <a:solidFill>
-                  <a:schemeClr val="tx1"/>
-                </a:solidFill>
-                <a:effectLst>
-                  <a:outerShdw blurRad="12700" dist="38100" dir="2700000" algn="tl" rotWithShape="0">
-                    <a:schemeClr val="bg1">
-                      <a:lumMod val="50000"/>
-                    </a:schemeClr>
-                  </a:outerShdw>
-                </a:effectLst>
-              </a:rPr>
-              <a:t>THANKYOU</a:t>
-            </a:r>
-          </a:p>
-        </p:txBody>
-      </p:sp>
-    </p:spTree>
-    <p:extLst>
-      <p:ext uri="{BB962C8B-B14F-4D97-AF65-F5344CB8AC3E}">
-        <p14:creationId xmlns:p14="http://schemas.microsoft.com/office/powerpoint/2010/main" val="822835669"/>
       </p:ext>
     </p:extLst>
   </p:cSld>

</xml_diff>